<commit_message>
Update ppt which will be used in 2017.03.10
</commit_message>
<xml_diff>
--- a/thoh/presentations/20170309.pptx
+++ b/thoh/presentations/20170309.pptx
@@ -9877,6 +9877,13 @@
               <a:rPr kumimoji="1" lang="en-US" altLang="zh-CN" dirty="0" smtClean="0"/>
               <a:t>Introduction</a:t>
             </a:r>
+            <a:br>
+              <a:rPr kumimoji="1" lang="en-US" altLang="zh-CN" dirty="0" smtClean="0"/>
+            </a:br>
+            <a:r>
+              <a:rPr kumimoji="1" lang="en-US" altLang="zh-CN" dirty="0" smtClean="0"/>
+              <a:t>Background</a:t>
+            </a:r>
             <a:endParaRPr kumimoji="1" lang="zh-CN" altLang="en-US" dirty="0"/>
           </a:p>
         </p:txBody>

</xml_diff>